<commit_message>
Made minor edits to documentation
</commit_message>
<xml_diff>
--- a/Lib/CommsUtility.pptx
+++ b/Lib/CommsUtility.pptx
@@ -115,6 +115,11 @@
       </a:defRPr>
     </a:lvl9pPr>
   </p:defaultTextStyle>
+  <p:extLst>
+    <p:ext uri="{EFAFB233-063F-42B5-8137-9DF3F51BA10A}">
+      <p15:sldGuideLst xmlns:p15="http://schemas.microsoft.com/office/powerpoint/2012/main"/>
+    </p:ext>
+  </p:extLst>
 </p:presentation>
 </file>
 
@@ -265,7 +270,7 @@
           <a:p>
             <a:fld id="{3C1B2DAD-4320-48D5-86D4-2664D798F664}" type="datetimeFigureOut">
               <a:rPr lang="en-US" smtClean="0"/>
-              <a:t>9/1/2020</a:t>
+              <a:t>1/21/2021</a:t>
             </a:fld>
             <a:endParaRPr lang="en-US"/>
           </a:p>
@@ -463,7 +468,7 @@
           <a:p>
             <a:fld id="{3C1B2DAD-4320-48D5-86D4-2664D798F664}" type="datetimeFigureOut">
               <a:rPr lang="en-US" smtClean="0"/>
-              <a:t>9/1/2020</a:t>
+              <a:t>1/21/2021</a:t>
             </a:fld>
             <a:endParaRPr lang="en-US"/>
           </a:p>
@@ -671,7 +676,7 @@
           <a:p>
             <a:fld id="{3C1B2DAD-4320-48D5-86D4-2664D798F664}" type="datetimeFigureOut">
               <a:rPr lang="en-US" smtClean="0"/>
-              <a:t>9/1/2020</a:t>
+              <a:t>1/21/2021</a:t>
             </a:fld>
             <a:endParaRPr lang="en-US"/>
           </a:p>
@@ -869,7 +874,7 @@
           <a:p>
             <a:fld id="{3C1B2DAD-4320-48D5-86D4-2664D798F664}" type="datetimeFigureOut">
               <a:rPr lang="en-US" smtClean="0"/>
-              <a:t>9/1/2020</a:t>
+              <a:t>1/21/2021</a:t>
             </a:fld>
             <a:endParaRPr lang="en-US"/>
           </a:p>
@@ -1144,7 +1149,7 @@
           <a:p>
             <a:fld id="{3C1B2DAD-4320-48D5-86D4-2664D798F664}" type="datetimeFigureOut">
               <a:rPr lang="en-US" smtClean="0"/>
-              <a:t>9/1/2020</a:t>
+              <a:t>1/21/2021</a:t>
             </a:fld>
             <a:endParaRPr lang="en-US"/>
           </a:p>
@@ -1409,7 +1414,7 @@
           <a:p>
             <a:fld id="{3C1B2DAD-4320-48D5-86D4-2664D798F664}" type="datetimeFigureOut">
               <a:rPr lang="en-US" smtClean="0"/>
-              <a:t>9/1/2020</a:t>
+              <a:t>1/21/2021</a:t>
             </a:fld>
             <a:endParaRPr lang="en-US"/>
           </a:p>
@@ -1821,7 +1826,7 @@
           <a:p>
             <a:fld id="{3C1B2DAD-4320-48D5-86D4-2664D798F664}" type="datetimeFigureOut">
               <a:rPr lang="en-US" smtClean="0"/>
-              <a:t>9/1/2020</a:t>
+              <a:t>1/21/2021</a:t>
             </a:fld>
             <a:endParaRPr lang="en-US"/>
           </a:p>
@@ -1962,7 +1967,7 @@
           <a:p>
             <a:fld id="{3C1B2DAD-4320-48D5-86D4-2664D798F664}" type="datetimeFigureOut">
               <a:rPr lang="en-US" smtClean="0"/>
-              <a:t>9/1/2020</a:t>
+              <a:t>1/21/2021</a:t>
             </a:fld>
             <a:endParaRPr lang="en-US"/>
           </a:p>
@@ -2075,7 +2080,7 @@
           <a:p>
             <a:fld id="{3C1B2DAD-4320-48D5-86D4-2664D798F664}" type="datetimeFigureOut">
               <a:rPr lang="en-US" smtClean="0"/>
-              <a:t>9/1/2020</a:t>
+              <a:t>1/21/2021</a:t>
             </a:fld>
             <a:endParaRPr lang="en-US"/>
           </a:p>
@@ -2386,7 +2391,7 @@
           <a:p>
             <a:fld id="{3C1B2DAD-4320-48D5-86D4-2664D798F664}" type="datetimeFigureOut">
               <a:rPr lang="en-US" smtClean="0"/>
-              <a:t>9/1/2020</a:t>
+              <a:t>1/21/2021</a:t>
             </a:fld>
             <a:endParaRPr lang="en-US"/>
           </a:p>
@@ -2674,7 +2679,7 @@
           <a:p>
             <a:fld id="{3C1B2DAD-4320-48D5-86D4-2664D798F664}" type="datetimeFigureOut">
               <a:rPr lang="en-US" smtClean="0"/>
-              <a:t>9/1/2020</a:t>
+              <a:t>1/21/2021</a:t>
             </a:fld>
             <a:endParaRPr lang="en-US"/>
           </a:p>
@@ -2915,7 +2920,7 @@
           <a:p>
             <a:fld id="{3C1B2DAD-4320-48D5-86D4-2664D798F664}" type="datetimeFigureOut">
               <a:rPr lang="en-US" smtClean="0"/>
-              <a:t>9/1/2020</a:t>
+              <a:t>1/21/2021</a:t>
             </a:fld>
             <a:endParaRPr lang="en-US"/>
           </a:p>
@@ -3383,7 +3388,7 @@
           <a:p>
             <a:r>
               <a:rPr lang="en-US" dirty="0"/>
-              <a:t>9/1/2020</a:t>
+              <a:t>1/21/2021</a:t>
             </a:r>
           </a:p>
           <a:p>
@@ -3965,7 +3970,7 @@
             <a:pPr lvl="1"/>
             <a:r>
               <a:rPr lang="en-US" dirty="0"/>
-              <a:t>Adding more sensors / removing sensors is non-trivial</a:t>
+              <a:t>Currently hard-code new sensors when we add them</a:t>
             </a:r>
           </a:p>
           <a:p>
@@ -4046,7 +4051,7 @@
           <a:p>
             <a:r>
               <a:rPr lang="en-US" dirty="0"/>
-              <a:t>High level goals</a:t>
+              <a:t>High level goals: modularity/future-proof</a:t>
             </a:r>
           </a:p>
         </p:txBody>

</xml_diff>